<commit_message>
Changed slide deck with more results
</commit_message>
<xml_diff>
--- a/Final project prompt slides.pptx
+++ b/Final project prompt slides.pptx
@@ -5,14 +5,19 @@
     <p:sldMasterId id="2147483648" r:id="rId1"/>
   </p:sldMasterIdLst>
   <p:notesMasterIdLst>
-    <p:notesMasterId r:id="rId7"/>
+    <p:notesMasterId r:id="rId12"/>
   </p:notesMasterIdLst>
   <p:sldIdLst>
     <p:sldId id="260" r:id="rId2"/>
     <p:sldId id="261" r:id="rId3"/>
     <p:sldId id="262" r:id="rId4"/>
-    <p:sldId id="263" r:id="rId5"/>
-    <p:sldId id="264" r:id="rId6"/>
+    <p:sldId id="265" r:id="rId5"/>
+    <p:sldId id="263" r:id="rId6"/>
+    <p:sldId id="266" r:id="rId7"/>
+    <p:sldId id="267" r:id="rId8"/>
+    <p:sldId id="268" r:id="rId9"/>
+    <p:sldId id="269" r:id="rId10"/>
+    <p:sldId id="264" r:id="rId11"/>
   </p:sldIdLst>
   <p:sldSz cx="12192000" cy="6858000"/>
   <p:notesSz cx="6858000" cy="9144000"/>
@@ -122,7 +127,7 @@
 <file path=ppt/revisionInfo.xml><?xml version="1.0" encoding="utf-8"?>
 <p1510:revInfo xmlns:a="http://schemas.openxmlformats.org/drawingml/2006/main" xmlns:r="http://schemas.openxmlformats.org/officeDocument/2006/relationships" xmlns:p1510="http://schemas.microsoft.com/office/powerpoint/2015/10/main">
   <p1510:revLst>
-    <p1510:client id="{F8B32761-AFE2-40B2-A44C-D2DBC59C3F2C}" v="7" dt="2025-03-17T16:09:56.872"/>
+    <p1510:client id="{F8B32761-AFE2-40B2-A44C-D2DBC59C3F2C}" v="15" dt="2025-03-18T11:38:09.695"/>
   </p1510:revLst>
 </p1510:revInfo>
 </file>
@@ -142,22 +147,6 @@
           <pc:docMk/>
           <pc:sldMk cId="754481681" sldId="256"/>
         </pc:sldMkLst>
-        <pc:spChg chg="mod">
-          <ac:chgData name="Lucy Knight" userId="c58305ac-d2e1-40ee-bd4f-8ace2050bbe0" providerId="ADAL" clId="{E0F56E00-D4A9-42AE-88F8-AA3C2B6F461A}" dt="2025-02-18T09:07:08.605" v="115" actId="20577"/>
-          <ac:spMkLst>
-            <pc:docMk/>
-            <pc:sldMk cId="754481681" sldId="256"/>
-            <ac:spMk id="2" creationId="{38C7C88C-D833-21D6-06CD-D0160D6B0DE7}"/>
-          </ac:spMkLst>
-        </pc:spChg>
-        <pc:spChg chg="mod">
-          <ac:chgData name="Lucy Knight" userId="c58305ac-d2e1-40ee-bd4f-8ace2050bbe0" providerId="ADAL" clId="{E0F56E00-D4A9-42AE-88F8-AA3C2B6F461A}" dt="2025-02-18T09:04:19.437" v="20" actId="20577"/>
-          <ac:spMkLst>
-            <pc:docMk/>
-            <pc:sldMk cId="754481681" sldId="256"/>
-            <ac:spMk id="3" creationId="{EC93E930-B91A-7D07-104E-E527847FA234}"/>
-          </ac:spMkLst>
-        </pc:spChg>
       </pc:sldChg>
       <pc:sldChg chg="delSp modSp mod">
         <pc:chgData name="Lucy Knight" userId="c58305ac-d2e1-40ee-bd4f-8ace2050bbe0" providerId="ADAL" clId="{E0F56E00-D4A9-42AE-88F8-AA3C2B6F461A}" dt="2025-02-18T09:06:39.046" v="99" actId="27636"/>
@@ -165,14 +154,6 @@
           <pc:docMk/>
           <pc:sldMk cId="800675438" sldId="257"/>
         </pc:sldMkLst>
-        <pc:spChg chg="mod">
-          <ac:chgData name="Lucy Knight" userId="c58305ac-d2e1-40ee-bd4f-8ace2050bbe0" providerId="ADAL" clId="{E0F56E00-D4A9-42AE-88F8-AA3C2B6F461A}" dt="2025-02-18T09:06:39.046" v="99" actId="27636"/>
-          <ac:spMkLst>
-            <pc:docMk/>
-            <pc:sldMk cId="800675438" sldId="257"/>
-            <ac:spMk id="3" creationId="{25F3CE3C-9680-FF6C-B573-0D64BF180C13}"/>
-          </ac:spMkLst>
-        </pc:spChg>
       </pc:sldChg>
       <pc:sldChg chg="del">
         <pc:chgData name="Lucy Knight" userId="c58305ac-d2e1-40ee-bd4f-8ace2050bbe0" providerId="ADAL" clId="{E0F56E00-D4A9-42AE-88F8-AA3C2B6F461A}" dt="2025-02-19T09:17:55.223" v="116" actId="47"/>
@@ -187,14 +168,6 @@
           <pc:docMk/>
           <pc:sldMk cId="3974184401" sldId="259"/>
         </pc:sldMkLst>
-        <pc:spChg chg="mod">
-          <ac:chgData name="Lucy Knight" userId="c58305ac-d2e1-40ee-bd4f-8ace2050bbe0" providerId="ADAL" clId="{E0F56E00-D4A9-42AE-88F8-AA3C2B6F461A}" dt="2025-02-18T09:06:23.827" v="96" actId="20577"/>
-          <ac:spMkLst>
-            <pc:docMk/>
-            <pc:sldMk cId="3974184401" sldId="259"/>
-            <ac:spMk id="3" creationId="{5C0AA2AC-113F-406D-753B-F0FB79BDDDAD}"/>
-          </ac:spMkLst>
-        </pc:spChg>
       </pc:sldChg>
       <pc:sldChg chg="modSp mod ord">
         <pc:chgData name="Lucy Knight" userId="c58305ac-d2e1-40ee-bd4f-8ace2050bbe0" providerId="ADAL" clId="{E0F56E00-D4A9-42AE-88F8-AA3C2B6F461A}" dt="2025-02-18T09:05:29.764" v="47" actId="20577"/>
@@ -202,21 +175,13 @@
           <pc:docMk/>
           <pc:sldMk cId="3087913205" sldId="265"/>
         </pc:sldMkLst>
-        <pc:spChg chg="mod">
-          <ac:chgData name="Lucy Knight" userId="c58305ac-d2e1-40ee-bd4f-8ace2050bbe0" providerId="ADAL" clId="{E0F56E00-D4A9-42AE-88F8-AA3C2B6F461A}" dt="2025-02-18T09:05:29.764" v="47" actId="20577"/>
-          <ac:spMkLst>
-            <pc:docMk/>
-            <pc:sldMk cId="3087913205" sldId="265"/>
-            <ac:spMk id="2" creationId="{4F27F8AF-F8D3-09DF-2865-321C791F8F4B}"/>
-          </ac:spMkLst>
-        </pc:spChg>
       </pc:sldChg>
     </pc:docChg>
   </pc:docChgLst>
   <pc:docChgLst>
     <pc:chgData name="Darren Garside" userId="1ff3dd00-c40d-412f-ba2a-26196dbfda33" providerId="ADAL" clId="{F8B32761-AFE2-40B2-A44C-D2DBC59C3F2C}"/>
-    <pc:docChg chg="undo custSel delSld modSld">
-      <pc:chgData name="Darren Garside" userId="1ff3dd00-c40d-412f-ba2a-26196dbfda33" providerId="ADAL" clId="{F8B32761-AFE2-40B2-A44C-D2DBC59C3F2C}" dt="2025-03-17T16:12:44.380" v="306" actId="2696"/>
+    <pc:docChg chg="undo custSel addSld delSld modSld sldOrd">
+      <pc:chgData name="Darren Garside" userId="1ff3dd00-c40d-412f-ba2a-26196dbfda33" providerId="ADAL" clId="{F8B32761-AFE2-40B2-A44C-D2DBC59C3F2C}" dt="2025-03-18T11:38:59.950" v="539" actId="121"/>
       <pc:docMkLst>
         <pc:docMk/>
       </pc:docMkLst>
@@ -257,7 +222,7 @@
         </pc:spChg>
       </pc:sldChg>
       <pc:sldChg chg="addSp delSp modSp mod setBg">
-        <pc:chgData name="Darren Garside" userId="1ff3dd00-c40d-412f-ba2a-26196dbfda33" providerId="ADAL" clId="{F8B32761-AFE2-40B2-A44C-D2DBC59C3F2C}" dt="2025-03-17T16:03:58.904" v="247" actId="1076"/>
+        <pc:chgData name="Darren Garside" userId="1ff3dd00-c40d-412f-ba2a-26196dbfda33" providerId="ADAL" clId="{F8B32761-AFE2-40B2-A44C-D2DBC59C3F2C}" dt="2025-03-18T11:24:22.770" v="319" actId="20577"/>
         <pc:sldMkLst>
           <pc:docMk/>
           <pc:sldMk cId="2161064156" sldId="262"/>
@@ -271,7 +236,7 @@
           </ac:spMkLst>
         </pc:spChg>
         <pc:spChg chg="mod">
-          <ac:chgData name="Darren Garside" userId="1ff3dd00-c40d-412f-ba2a-26196dbfda33" providerId="ADAL" clId="{F8B32761-AFE2-40B2-A44C-D2DBC59C3F2C}" dt="2025-03-17T16:03:58.904" v="247" actId="1076"/>
+          <ac:chgData name="Darren Garside" userId="1ff3dd00-c40d-412f-ba2a-26196dbfda33" providerId="ADAL" clId="{F8B32761-AFE2-40B2-A44C-D2DBC59C3F2C}" dt="2025-03-18T11:24:22.770" v="319" actId="20577"/>
           <ac:spMkLst>
             <pc:docMk/>
             <pc:sldMk cId="2161064156" sldId="262"/>
@@ -368,7 +333,7 @@
         </pc:picChg>
       </pc:sldChg>
       <pc:sldChg chg="addSp delSp modSp mod">
-        <pc:chgData name="Darren Garside" userId="1ff3dd00-c40d-412f-ba2a-26196dbfda33" providerId="ADAL" clId="{F8B32761-AFE2-40B2-A44C-D2DBC59C3F2C}" dt="2025-03-17T16:11:15.210" v="305" actId="1076"/>
+        <pc:chgData name="Darren Garside" userId="1ff3dd00-c40d-412f-ba2a-26196dbfda33" providerId="ADAL" clId="{F8B32761-AFE2-40B2-A44C-D2DBC59C3F2C}" dt="2025-03-18T11:32:21.347" v="414" actId="1076"/>
         <pc:sldMkLst>
           <pc:docMk/>
           <pc:sldMk cId="3448502234" sldId="263"/>
@@ -379,6 +344,14 @@
             <pc:docMk/>
             <pc:sldMk cId="3448502234" sldId="263"/>
             <ac:spMk id="2" creationId="{028E3A60-DF3B-3644-1B0F-872B870218D3}"/>
+          </ac:spMkLst>
+        </pc:spChg>
+        <pc:spChg chg="add mod">
+          <ac:chgData name="Darren Garside" userId="1ff3dd00-c40d-412f-ba2a-26196dbfda33" providerId="ADAL" clId="{F8B32761-AFE2-40B2-A44C-D2DBC59C3F2C}" dt="2025-03-18T11:32:21.347" v="414" actId="1076"/>
+          <ac:spMkLst>
+            <pc:docMk/>
+            <pc:sldMk cId="3448502234" sldId="263"/>
+            <ac:spMk id="2" creationId="{95AD8586-7920-BDBC-622D-C7E03657F641}"/>
           </ac:spMkLst>
         </pc:spChg>
         <pc:spChg chg="del">
@@ -422,23 +395,23 @@
           </ac:picMkLst>
         </pc:picChg>
         <pc:picChg chg="add mod">
-          <ac:chgData name="Darren Garside" userId="1ff3dd00-c40d-412f-ba2a-26196dbfda33" providerId="ADAL" clId="{F8B32761-AFE2-40B2-A44C-D2DBC59C3F2C}" dt="2025-03-17T16:10:42.832" v="301" actId="1076"/>
+          <ac:chgData name="Darren Garside" userId="1ff3dd00-c40d-412f-ba2a-26196dbfda33" providerId="ADAL" clId="{F8B32761-AFE2-40B2-A44C-D2DBC59C3F2C}" dt="2025-03-18T11:32:04.869" v="411" actId="1076"/>
           <ac:picMkLst>
             <pc:docMk/>
             <pc:sldMk cId="3448502234" sldId="263"/>
             <ac:picMk id="13" creationId="{12DBC42D-937E-655A-382E-E8ACCD9DF1AF}"/>
           </ac:picMkLst>
         </pc:picChg>
-        <pc:picChg chg="add mod">
-          <ac:chgData name="Darren Garside" userId="1ff3dd00-c40d-412f-ba2a-26196dbfda33" providerId="ADAL" clId="{F8B32761-AFE2-40B2-A44C-D2DBC59C3F2C}" dt="2025-03-17T16:11:15.210" v="305" actId="1076"/>
+        <pc:picChg chg="add del mod">
+          <ac:chgData name="Darren Garside" userId="1ff3dd00-c40d-412f-ba2a-26196dbfda33" providerId="ADAL" clId="{F8B32761-AFE2-40B2-A44C-D2DBC59C3F2C}" dt="2025-03-18T11:23:20.631" v="308" actId="478"/>
           <ac:picMkLst>
             <pc:docMk/>
             <pc:sldMk cId="3448502234" sldId="263"/>
             <ac:picMk id="15" creationId="{24E85237-4584-CA27-8CFC-32F123433F12}"/>
           </ac:picMkLst>
         </pc:picChg>
-        <pc:picChg chg="add mod ord">
-          <ac:chgData name="Darren Garside" userId="1ff3dd00-c40d-412f-ba2a-26196dbfda33" providerId="ADAL" clId="{F8B32761-AFE2-40B2-A44C-D2DBC59C3F2C}" dt="2025-03-17T16:11:09.392" v="304" actId="14100"/>
+        <pc:picChg chg="add del mod ord">
+          <ac:chgData name="Darren Garside" userId="1ff3dd00-c40d-412f-ba2a-26196dbfda33" providerId="ADAL" clId="{F8B32761-AFE2-40B2-A44C-D2DBC59C3F2C}" dt="2025-03-18T11:23:19.359" v="307" actId="478"/>
           <ac:picMkLst>
             <pc:docMk/>
             <pc:sldMk cId="3448502234" sldId="263"/>
@@ -446,12 +419,36 @@
           </ac:picMkLst>
         </pc:picChg>
       </pc:sldChg>
-      <pc:sldChg chg="addSp modSp mod">
-        <pc:chgData name="Darren Garside" userId="1ff3dd00-c40d-412f-ba2a-26196dbfda33" providerId="ADAL" clId="{F8B32761-AFE2-40B2-A44C-D2DBC59C3F2C}" dt="2025-03-17T16:08:51.808" v="293" actId="1076"/>
+      <pc:sldChg chg="addSp delSp modSp mod">
+        <pc:chgData name="Darren Garside" userId="1ff3dd00-c40d-412f-ba2a-26196dbfda33" providerId="ADAL" clId="{F8B32761-AFE2-40B2-A44C-D2DBC59C3F2C}" dt="2025-03-18T11:38:59.950" v="539" actId="121"/>
         <pc:sldMkLst>
           <pc:docMk/>
           <pc:sldMk cId="3204788620" sldId="264"/>
         </pc:sldMkLst>
+        <pc:spChg chg="add mod">
+          <ac:chgData name="Darren Garside" userId="1ff3dd00-c40d-412f-ba2a-26196dbfda33" providerId="ADAL" clId="{F8B32761-AFE2-40B2-A44C-D2DBC59C3F2C}" dt="2025-03-18T11:25:19.616" v="322" actId="1076"/>
+          <ac:spMkLst>
+            <pc:docMk/>
+            <pc:sldMk cId="3204788620" sldId="264"/>
+            <ac:spMk id="6" creationId="{533AC8A3-ECE5-6836-975B-47958C0DA405}"/>
+          </ac:spMkLst>
+        </pc:spChg>
+        <pc:spChg chg="add del mod">
+          <ac:chgData name="Darren Garside" userId="1ff3dd00-c40d-412f-ba2a-26196dbfda33" providerId="ADAL" clId="{F8B32761-AFE2-40B2-A44C-D2DBC59C3F2C}" dt="2025-03-18T11:25:20.357" v="324"/>
+          <ac:spMkLst>
+            <pc:docMk/>
+            <pc:sldMk cId="3204788620" sldId="264"/>
+            <ac:spMk id="7" creationId="{8587E370-F142-F014-D5A0-2DF73B80543D}"/>
+          </ac:spMkLst>
+        </pc:spChg>
+        <pc:spChg chg="add mod">
+          <ac:chgData name="Darren Garside" userId="1ff3dd00-c40d-412f-ba2a-26196dbfda33" providerId="ADAL" clId="{F8B32761-AFE2-40B2-A44C-D2DBC59C3F2C}" dt="2025-03-18T11:38:59.950" v="539" actId="121"/>
+          <ac:spMkLst>
+            <pc:docMk/>
+            <pc:sldMk cId="3204788620" sldId="264"/>
+            <ac:spMk id="8" creationId="{1E9E8E0A-BA22-B8FA-A375-C7A85F993A98}"/>
+          </ac:spMkLst>
+        </pc:spChg>
         <pc:picChg chg="add mod">
           <ac:chgData name="Darren Garside" userId="1ff3dd00-c40d-412f-ba2a-26196dbfda33" providerId="ADAL" clId="{F8B32761-AFE2-40B2-A44C-D2DBC59C3F2C}" dt="2025-03-17T16:08:51.808" v="293" actId="1076"/>
           <ac:picMkLst>
@@ -467,6 +464,161 @@
           <pc:docMk/>
           <pc:sldMk cId="3087913205" sldId="265"/>
         </pc:sldMkLst>
+      </pc:sldChg>
+      <pc:sldChg chg="addSp delSp modSp new mod ord setBg">
+        <pc:chgData name="Darren Garside" userId="1ff3dd00-c40d-412f-ba2a-26196dbfda33" providerId="ADAL" clId="{F8B32761-AFE2-40B2-A44C-D2DBC59C3F2C}" dt="2025-03-18T11:30:48.450" v="363"/>
+        <pc:sldMkLst>
+          <pc:docMk/>
+          <pc:sldMk cId="4252103257" sldId="265"/>
+        </pc:sldMkLst>
+        <pc:spChg chg="del">
+          <ac:chgData name="Darren Garside" userId="1ff3dd00-c40d-412f-ba2a-26196dbfda33" providerId="ADAL" clId="{F8B32761-AFE2-40B2-A44C-D2DBC59C3F2C}" dt="2025-03-18T11:27:18.718" v="326" actId="478"/>
+          <ac:spMkLst>
+            <pc:docMk/>
+            <pc:sldMk cId="4252103257" sldId="265"/>
+            <ac:spMk id="2" creationId="{4E696E12-45E8-8989-9031-7BD9FE144BB7}"/>
+          </ac:spMkLst>
+        </pc:spChg>
+        <pc:spChg chg="del">
+          <ac:chgData name="Darren Garside" userId="1ff3dd00-c40d-412f-ba2a-26196dbfda33" providerId="ADAL" clId="{F8B32761-AFE2-40B2-A44C-D2DBC59C3F2C}" dt="2025-03-18T11:27:20.398" v="327" actId="478"/>
+          <ac:spMkLst>
+            <pc:docMk/>
+            <pc:sldMk cId="4252103257" sldId="265"/>
+            <ac:spMk id="3" creationId="{357A4E6B-25D6-C3A5-1880-A6AEBE8B5B3C}"/>
+          </ac:spMkLst>
+        </pc:spChg>
+        <pc:spChg chg="add mod">
+          <ac:chgData name="Darren Garside" userId="1ff3dd00-c40d-412f-ba2a-26196dbfda33" providerId="ADAL" clId="{F8B32761-AFE2-40B2-A44C-D2DBC59C3F2C}" dt="2025-03-18T11:29:37.333" v="360" actId="1076"/>
+          <ac:spMkLst>
+            <pc:docMk/>
+            <pc:sldMk cId="4252103257" sldId="265"/>
+            <ac:spMk id="5" creationId="{1920EEBA-69C4-A36C-BAD0-3BE4066F491E}"/>
+          </ac:spMkLst>
+        </pc:spChg>
+      </pc:sldChg>
+      <pc:sldChg chg="addSp delSp modSp add mod">
+        <pc:chgData name="Darren Garside" userId="1ff3dd00-c40d-412f-ba2a-26196dbfda33" providerId="ADAL" clId="{F8B32761-AFE2-40B2-A44C-D2DBC59C3F2C}" dt="2025-03-18T11:33:28.071" v="443" actId="20577"/>
+        <pc:sldMkLst>
+          <pc:docMk/>
+          <pc:sldMk cId="3263353591" sldId="266"/>
+        </pc:sldMkLst>
+        <pc:spChg chg="mod">
+          <ac:chgData name="Darren Garside" userId="1ff3dd00-c40d-412f-ba2a-26196dbfda33" providerId="ADAL" clId="{F8B32761-AFE2-40B2-A44C-D2DBC59C3F2C}" dt="2025-03-18T11:33:28.071" v="443" actId="20577"/>
+          <ac:spMkLst>
+            <pc:docMk/>
+            <pc:sldMk cId="3263353591" sldId="266"/>
+            <ac:spMk id="2" creationId="{188E9D38-6ED5-CC8B-7BC5-AD67629241B2}"/>
+          </ac:spMkLst>
+        </pc:spChg>
+        <pc:picChg chg="add mod">
+          <ac:chgData name="Darren Garside" userId="1ff3dd00-c40d-412f-ba2a-26196dbfda33" providerId="ADAL" clId="{F8B32761-AFE2-40B2-A44C-D2DBC59C3F2C}" dt="2025-03-18T11:33:16.135" v="422" actId="1076"/>
+          <ac:picMkLst>
+            <pc:docMk/>
+            <pc:sldMk cId="3263353591" sldId="266"/>
+            <ac:picMk id="4" creationId="{8E5CCEFC-D10C-982F-A519-C7AB796F3DA3}"/>
+          </ac:picMkLst>
+        </pc:picChg>
+        <pc:picChg chg="del mod">
+          <ac:chgData name="Darren Garside" userId="1ff3dd00-c40d-412f-ba2a-26196dbfda33" providerId="ADAL" clId="{F8B32761-AFE2-40B2-A44C-D2DBC59C3F2C}" dt="2025-03-18T11:33:11.849" v="421" actId="478"/>
+          <ac:picMkLst>
+            <pc:docMk/>
+            <pc:sldMk cId="3263353591" sldId="266"/>
+            <ac:picMk id="13" creationId="{41565EB5-D9A8-A4FB-3FDC-EA337253DE2D}"/>
+          </ac:picMkLst>
+        </pc:picChg>
+      </pc:sldChg>
+      <pc:sldChg chg="addSp delSp modSp add mod">
+        <pc:chgData name="Darren Garside" userId="1ff3dd00-c40d-412f-ba2a-26196dbfda33" providerId="ADAL" clId="{F8B32761-AFE2-40B2-A44C-D2DBC59C3F2C}" dt="2025-03-18T11:33:53.662" v="469" actId="20577"/>
+        <pc:sldMkLst>
+          <pc:docMk/>
+          <pc:sldMk cId="4074861341" sldId="267"/>
+        </pc:sldMkLst>
+        <pc:spChg chg="mod">
+          <ac:chgData name="Darren Garside" userId="1ff3dd00-c40d-412f-ba2a-26196dbfda33" providerId="ADAL" clId="{F8B32761-AFE2-40B2-A44C-D2DBC59C3F2C}" dt="2025-03-18T11:33:53.662" v="469" actId="20577"/>
+          <ac:spMkLst>
+            <pc:docMk/>
+            <pc:sldMk cId="4074861341" sldId="267"/>
+            <ac:spMk id="2" creationId="{EA8063B0-7D30-BD7E-63F2-85A8F1BD3991}"/>
+          </ac:spMkLst>
+        </pc:spChg>
+        <pc:picChg chg="add mod">
+          <ac:chgData name="Darren Garside" userId="1ff3dd00-c40d-412f-ba2a-26196dbfda33" providerId="ADAL" clId="{F8B32761-AFE2-40B2-A44C-D2DBC59C3F2C}" dt="2025-03-18T11:33:44.462" v="448" actId="1076"/>
+          <ac:picMkLst>
+            <pc:docMk/>
+            <pc:sldMk cId="4074861341" sldId="267"/>
+            <ac:picMk id="4" creationId="{F2BD8F06-27BE-F8D0-D1A9-411A435D7E3C}"/>
+          </ac:picMkLst>
+        </pc:picChg>
+        <pc:picChg chg="del">
+          <ac:chgData name="Darren Garside" userId="1ff3dd00-c40d-412f-ba2a-26196dbfda33" providerId="ADAL" clId="{F8B32761-AFE2-40B2-A44C-D2DBC59C3F2C}" dt="2025-03-18T11:33:40.766" v="447" actId="478"/>
+          <ac:picMkLst>
+            <pc:docMk/>
+            <pc:sldMk cId="4074861341" sldId="267"/>
+            <ac:picMk id="13" creationId="{B33A75E8-51E0-952B-EE67-C7D69B59B216}"/>
+          </ac:picMkLst>
+        </pc:picChg>
+      </pc:sldChg>
+      <pc:sldChg chg="addSp delSp modSp add mod">
+        <pc:chgData name="Darren Garside" userId="1ff3dd00-c40d-412f-ba2a-26196dbfda33" providerId="ADAL" clId="{F8B32761-AFE2-40B2-A44C-D2DBC59C3F2C}" dt="2025-03-18T11:34:23.214" v="491" actId="20577"/>
+        <pc:sldMkLst>
+          <pc:docMk/>
+          <pc:sldMk cId="2944873762" sldId="268"/>
+        </pc:sldMkLst>
+        <pc:spChg chg="mod">
+          <ac:chgData name="Darren Garside" userId="1ff3dd00-c40d-412f-ba2a-26196dbfda33" providerId="ADAL" clId="{F8B32761-AFE2-40B2-A44C-D2DBC59C3F2C}" dt="2025-03-18T11:34:23.214" v="491" actId="20577"/>
+          <ac:spMkLst>
+            <pc:docMk/>
+            <pc:sldMk cId="2944873762" sldId="268"/>
+            <ac:spMk id="2" creationId="{ECB58F6E-0976-6E70-2C13-3FE86AA53705}"/>
+          </ac:spMkLst>
+        </pc:spChg>
+        <pc:picChg chg="add mod">
+          <ac:chgData name="Darren Garside" userId="1ff3dd00-c40d-412f-ba2a-26196dbfda33" providerId="ADAL" clId="{F8B32761-AFE2-40B2-A44C-D2DBC59C3F2C}" dt="2025-03-18T11:34:17.626" v="474" actId="1076"/>
+          <ac:picMkLst>
+            <pc:docMk/>
+            <pc:sldMk cId="2944873762" sldId="268"/>
+            <ac:picMk id="4" creationId="{F15934B4-8251-37DA-2C4F-AAC598CD4E7F}"/>
+          </ac:picMkLst>
+        </pc:picChg>
+        <pc:picChg chg="del">
+          <ac:chgData name="Darren Garside" userId="1ff3dd00-c40d-412f-ba2a-26196dbfda33" providerId="ADAL" clId="{F8B32761-AFE2-40B2-A44C-D2DBC59C3F2C}" dt="2025-03-18T11:34:13.302" v="473" actId="478"/>
+          <ac:picMkLst>
+            <pc:docMk/>
+            <pc:sldMk cId="2944873762" sldId="268"/>
+            <ac:picMk id="13" creationId="{349B4E90-2C55-90FA-A00B-41F9F4CB326A}"/>
+          </ac:picMkLst>
+        </pc:picChg>
+      </pc:sldChg>
+      <pc:sldChg chg="addSp delSp modSp add mod replId">
+        <pc:chgData name="Darren Garside" userId="1ff3dd00-c40d-412f-ba2a-26196dbfda33" providerId="ADAL" clId="{F8B32761-AFE2-40B2-A44C-D2DBC59C3F2C}" dt="2025-03-18T11:34:42.382" v="515" actId="20577"/>
+        <pc:sldMkLst>
+          <pc:docMk/>
+          <pc:sldMk cId="273028448" sldId="269"/>
+        </pc:sldMkLst>
+        <pc:spChg chg="mod">
+          <ac:chgData name="Darren Garside" userId="1ff3dd00-c40d-412f-ba2a-26196dbfda33" providerId="ADAL" clId="{F8B32761-AFE2-40B2-A44C-D2DBC59C3F2C}" dt="2025-03-18T11:34:42.382" v="515" actId="20577"/>
+          <ac:spMkLst>
+            <pc:docMk/>
+            <pc:sldMk cId="273028448" sldId="269"/>
+            <ac:spMk id="2" creationId="{4E21B57F-00F6-C848-DCB6-397A33B768E3}"/>
+          </ac:spMkLst>
+        </pc:spChg>
+        <pc:picChg chg="add mod">
+          <ac:chgData name="Darren Garside" userId="1ff3dd00-c40d-412f-ba2a-26196dbfda33" providerId="ADAL" clId="{F8B32761-AFE2-40B2-A44C-D2DBC59C3F2C}" dt="2025-03-18T11:34:36.536" v="496" actId="1076"/>
+          <ac:picMkLst>
+            <pc:docMk/>
+            <pc:sldMk cId="273028448" sldId="269"/>
+            <ac:picMk id="4" creationId="{CD329151-3072-14D4-05F9-F06A87E31036}"/>
+          </ac:picMkLst>
+        </pc:picChg>
+        <pc:picChg chg="del">
+          <ac:chgData name="Darren Garside" userId="1ff3dd00-c40d-412f-ba2a-26196dbfda33" providerId="ADAL" clId="{F8B32761-AFE2-40B2-A44C-D2DBC59C3F2C}" dt="2025-03-18T11:34:33.390" v="495" actId="478"/>
+          <ac:picMkLst>
+            <pc:docMk/>
+            <pc:sldMk cId="273028448" sldId="269"/>
+            <ac:picMk id="13" creationId="{3A34B2CE-C96D-908F-4443-9A650B8896FA}"/>
+          </ac:picMkLst>
+        </pc:picChg>
       </pc:sldChg>
     </pc:docChg>
   </pc:docChgLst>
@@ -730,7 +882,7 @@
           <a:p>
             <a:fld id="{34112E37-C587-4692-B5DD-0A3B48A22AD8}" type="datetimeFigureOut">
               <a:rPr lang="en-GB" smtClean="0"/>
-              <a:t>17/03/2025</a:t>
+              <a:t>18/03/2025</a:t>
             </a:fld>
             <a:endParaRPr lang="en-GB"/>
           </a:p>
@@ -1391,7 +1543,7 @@
           <a:p>
             <a:fld id="{195FDFDA-6C80-4589-A05F-42F9461A9CEE}" type="datetimeFigureOut">
               <a:rPr lang="en-GB" smtClean="0"/>
-              <a:t>17/03/2025</a:t>
+              <a:t>18/03/2025</a:t>
             </a:fld>
             <a:endParaRPr lang="en-GB"/>
           </a:p>
@@ -1591,7 +1743,7 @@
           <a:p>
             <a:fld id="{195FDFDA-6C80-4589-A05F-42F9461A9CEE}" type="datetimeFigureOut">
               <a:rPr lang="en-GB" smtClean="0"/>
-              <a:t>17/03/2025</a:t>
+              <a:t>18/03/2025</a:t>
             </a:fld>
             <a:endParaRPr lang="en-GB"/>
           </a:p>
@@ -1801,7 +1953,7 @@
           <a:p>
             <a:fld id="{195FDFDA-6C80-4589-A05F-42F9461A9CEE}" type="datetimeFigureOut">
               <a:rPr lang="en-GB" smtClean="0"/>
-              <a:t>17/03/2025</a:t>
+              <a:t>18/03/2025</a:t>
             </a:fld>
             <a:endParaRPr lang="en-GB"/>
           </a:p>
@@ -2001,7 +2153,7 @@
           <a:p>
             <a:fld id="{195FDFDA-6C80-4589-A05F-42F9461A9CEE}" type="datetimeFigureOut">
               <a:rPr lang="en-GB" smtClean="0"/>
-              <a:t>17/03/2025</a:t>
+              <a:t>18/03/2025</a:t>
             </a:fld>
             <a:endParaRPr lang="en-GB"/>
           </a:p>
@@ -2277,7 +2429,7 @@
           <a:p>
             <a:fld id="{195FDFDA-6C80-4589-A05F-42F9461A9CEE}" type="datetimeFigureOut">
               <a:rPr lang="en-GB" smtClean="0"/>
-              <a:t>17/03/2025</a:t>
+              <a:t>18/03/2025</a:t>
             </a:fld>
             <a:endParaRPr lang="en-GB"/>
           </a:p>
@@ -2545,7 +2697,7 @@
           <a:p>
             <a:fld id="{195FDFDA-6C80-4589-A05F-42F9461A9CEE}" type="datetimeFigureOut">
               <a:rPr lang="en-GB" smtClean="0"/>
-              <a:t>17/03/2025</a:t>
+              <a:t>18/03/2025</a:t>
             </a:fld>
             <a:endParaRPr lang="en-GB"/>
           </a:p>
@@ -2960,7 +3112,7 @@
           <a:p>
             <a:fld id="{195FDFDA-6C80-4589-A05F-42F9461A9CEE}" type="datetimeFigureOut">
               <a:rPr lang="en-GB" smtClean="0"/>
-              <a:t>17/03/2025</a:t>
+              <a:t>18/03/2025</a:t>
             </a:fld>
             <a:endParaRPr lang="en-GB"/>
           </a:p>
@@ -3102,7 +3254,7 @@
           <a:p>
             <a:fld id="{195FDFDA-6C80-4589-A05F-42F9461A9CEE}" type="datetimeFigureOut">
               <a:rPr lang="en-GB" smtClean="0"/>
-              <a:t>17/03/2025</a:t>
+              <a:t>18/03/2025</a:t>
             </a:fld>
             <a:endParaRPr lang="en-GB"/>
           </a:p>
@@ -3215,7 +3367,7 @@
           <a:p>
             <a:fld id="{195FDFDA-6C80-4589-A05F-42F9461A9CEE}" type="datetimeFigureOut">
               <a:rPr lang="en-GB" smtClean="0"/>
-              <a:t>17/03/2025</a:t>
+              <a:t>18/03/2025</a:t>
             </a:fld>
             <a:endParaRPr lang="en-GB"/>
           </a:p>
@@ -3528,7 +3680,7 @@
           <a:p>
             <a:fld id="{195FDFDA-6C80-4589-A05F-42F9461A9CEE}" type="datetimeFigureOut">
               <a:rPr lang="en-GB" smtClean="0"/>
-              <a:t>17/03/2025</a:t>
+              <a:t>18/03/2025</a:t>
             </a:fld>
             <a:endParaRPr lang="en-GB"/>
           </a:p>
@@ -3817,7 +3969,7 @@
           <a:p>
             <a:fld id="{195FDFDA-6C80-4589-A05F-42F9461A9CEE}" type="datetimeFigureOut">
               <a:rPr lang="en-GB" smtClean="0"/>
-              <a:t>17/03/2025</a:t>
+              <a:t>18/03/2025</a:t>
             </a:fld>
             <a:endParaRPr lang="en-GB"/>
           </a:p>
@@ -4060,7 +4212,7 @@
           <a:p>
             <a:fld id="{195FDFDA-6C80-4589-A05F-42F9461A9CEE}" type="datetimeFigureOut">
               <a:rPr lang="en-GB" smtClean="0"/>
-              <a:t>17/03/2025</a:t>
+              <a:t>18/03/2025</a:t>
             </a:fld>
             <a:endParaRPr lang="en-GB"/>
           </a:p>
@@ -4829,6 +4981,210 @@
     <p:extLst>
       <p:ext uri="{BB962C8B-B14F-4D97-AF65-F5344CB8AC3E}">
         <p14:creationId xmlns:p14="http://schemas.microsoft.com/office/powerpoint/2010/main" val="3173600755"/>
+      </p:ext>
+    </p:extLst>
+  </p:cSld>
+  <p:clrMapOvr>
+    <a:masterClrMapping/>
+  </p:clrMapOvr>
+</p:sld>
+</file>
+
+<file path=ppt/slides/slide10.xml><?xml version="1.0" encoding="utf-8"?>
+<p:sld xmlns:a="http://schemas.openxmlformats.org/drawingml/2006/main" xmlns:r="http://schemas.openxmlformats.org/officeDocument/2006/relationships" xmlns:p="http://schemas.openxmlformats.org/presentationml/2006/main">
+  <p:cSld>
+    <p:bg>
+      <p:bgPr>
+        <a:solidFill>
+          <a:schemeClr val="bg2"/>
+        </a:solidFill>
+        <a:effectLst/>
+      </p:bgPr>
+    </p:bg>
+    <p:spTree>
+      <p:nvGrpSpPr>
+        <p:cNvPr id="1" name=""/>
+        <p:cNvGrpSpPr/>
+        <p:nvPr/>
+      </p:nvGrpSpPr>
+      <p:grpSpPr>
+        <a:xfrm>
+          <a:off x="0" y="0"/>
+          <a:ext cx="0" cy="0"/>
+          <a:chOff x="0" y="0"/>
+          <a:chExt cx="0" cy="0"/>
+        </a:xfrm>
+      </p:grpSpPr>
+      <p:sp>
+        <p:nvSpPr>
+          <p:cNvPr id="2" name="Title 1">
+            <a:extLst>
+              <a:ext uri="{FF2B5EF4-FFF2-40B4-BE49-F238E27FC236}">
+                <a16:creationId xmlns:a16="http://schemas.microsoft.com/office/drawing/2014/main" id="{7208797E-A21F-2C1A-56F8-EF71A7FECE9C}"/>
+              </a:ext>
+            </a:extLst>
+          </p:cNvPr>
+          <p:cNvSpPr>
+            <a:spLocks noGrp="1"/>
+          </p:cNvSpPr>
+          <p:nvPr>
+            <p:ph type="title"/>
+          </p:nvPr>
+        </p:nvSpPr>
+        <p:spPr/>
+        <p:txBody>
+          <a:bodyPr/>
+          <a:lstStyle/>
+          <a:p>
+            <a:r>
+              <a:rPr lang="en-GB" dirty="0"/>
+              <a:t>This is my summary</a:t>
+            </a:r>
+          </a:p>
+        </p:txBody>
+      </p:sp>
+      <p:sp>
+        <p:nvSpPr>
+          <p:cNvPr id="3" name="Text Placeholder 2">
+            <a:extLst>
+              <a:ext uri="{FF2B5EF4-FFF2-40B4-BE49-F238E27FC236}">
+                <a16:creationId xmlns:a16="http://schemas.microsoft.com/office/drawing/2014/main" id="{1066285B-70FD-1CFB-1083-B23680BB3487}"/>
+              </a:ext>
+            </a:extLst>
+          </p:cNvPr>
+          <p:cNvSpPr>
+            <a:spLocks noGrp="1"/>
+          </p:cNvSpPr>
+          <p:nvPr>
+            <p:ph type="body" idx="1"/>
+          </p:nvPr>
+        </p:nvSpPr>
+        <p:spPr/>
+        <p:txBody>
+          <a:bodyPr/>
+          <a:lstStyle/>
+          <a:p>
+            <a:r>
+              <a:rPr lang="en-GB" dirty="0"/>
+              <a:t>And here is a nice chart to illustrate it</a:t>
+            </a:r>
+          </a:p>
+        </p:txBody>
+      </p:sp>
+      <p:pic>
+        <p:nvPicPr>
+          <p:cNvPr id="5" name="Picture 4" descr="A network of colorful circles&#10;&#10;AI-generated content may be incorrect.">
+            <a:extLst>
+              <a:ext uri="{FF2B5EF4-FFF2-40B4-BE49-F238E27FC236}">
+                <a16:creationId xmlns:a16="http://schemas.microsoft.com/office/drawing/2014/main" id="{5358C7FD-9443-41D4-7430-9026C930ADD4}"/>
+              </a:ext>
+            </a:extLst>
+          </p:cNvPr>
+          <p:cNvPicPr>
+            <a:picLocks noChangeAspect="1"/>
+          </p:cNvPicPr>
+          <p:nvPr/>
+        </p:nvPicPr>
+        <p:blipFill>
+          <a:blip r:embed="rId2">
+            <a:extLst>
+              <a:ext uri="{28A0092B-C50C-407E-A947-70E740481C1C}">
+                <a14:useLocalDpi xmlns:a14="http://schemas.microsoft.com/office/drawing/2010/main" val="0"/>
+              </a:ext>
+            </a:extLst>
+          </a:blip>
+          <a:stretch>
+            <a:fillRect/>
+          </a:stretch>
+        </p:blipFill>
+        <p:spPr>
+          <a:xfrm>
+            <a:off x="0" y="-224904"/>
+            <a:ext cx="12192000" cy="7072215"/>
+          </a:xfrm>
+          <a:prstGeom prst="rect">
+            <a:avLst/>
+          </a:prstGeom>
+        </p:spPr>
+      </p:pic>
+      <p:sp>
+        <p:nvSpPr>
+          <p:cNvPr id="6" name="TextBox 5">
+            <a:extLst>
+              <a:ext uri="{FF2B5EF4-FFF2-40B4-BE49-F238E27FC236}">
+                <a16:creationId xmlns:a16="http://schemas.microsoft.com/office/drawing/2014/main" id="{533AC8A3-ECE5-6836-975B-47958C0DA405}"/>
+              </a:ext>
+            </a:extLst>
+          </p:cNvPr>
+          <p:cNvSpPr txBox="1"/>
+          <p:nvPr/>
+        </p:nvSpPr>
+        <p:spPr>
+          <a:xfrm>
+            <a:off x="0" y="-227079"/>
+            <a:ext cx="6134792" cy="646331"/>
+          </a:xfrm>
+          <a:prstGeom prst="rect">
+            <a:avLst/>
+          </a:prstGeom>
+          <a:noFill/>
+        </p:spPr>
+        <p:txBody>
+          <a:bodyPr wrap="square">
+            <a:spAutoFit/>
+          </a:bodyPr>
+          <a:lstStyle/>
+          <a:p>
+            <a:r>
+              <a:rPr lang="en-GB" dirty="0"/>
+              <a:t>Are there identifiable features of students’ citation practices that we can use as insights for our teaching?</a:t>
+            </a:r>
+          </a:p>
+        </p:txBody>
+      </p:sp>
+      <p:sp>
+        <p:nvSpPr>
+          <p:cNvPr id="8" name="TextBox 7">
+            <a:extLst>
+              <a:ext uri="{FF2B5EF4-FFF2-40B4-BE49-F238E27FC236}">
+                <a16:creationId xmlns:a16="http://schemas.microsoft.com/office/drawing/2014/main" id="{1E9E8E0A-BA22-B8FA-A375-C7A85F993A98}"/>
+              </a:ext>
+            </a:extLst>
+          </p:cNvPr>
+          <p:cNvSpPr txBox="1"/>
+          <p:nvPr/>
+        </p:nvSpPr>
+        <p:spPr>
+          <a:xfrm>
+            <a:off x="6594953" y="6477979"/>
+            <a:ext cx="5597047" cy="369332"/>
+          </a:xfrm>
+          <a:prstGeom prst="rect">
+            <a:avLst/>
+          </a:prstGeom>
+          <a:noFill/>
+        </p:spPr>
+        <p:txBody>
+          <a:bodyPr wrap="square" rtlCol="0">
+            <a:spAutoFit/>
+          </a:bodyPr>
+          <a:lstStyle/>
+          <a:p>
+            <a:pPr algn="r"/>
+            <a:r>
+              <a:rPr lang="en-GB" dirty="0">
+                <a:hlinkClick r:id="rId3"/>
+              </a:rPr>
+              <a:t>https://github.com/darrengarside/DAML_FinalProject</a:t>
+            </a:r>
+            <a:endParaRPr lang="en-GB" dirty="0"/>
+          </a:p>
+        </p:txBody>
+      </p:sp>
+    </p:spTree>
+    <p:extLst>
+      <p:ext uri="{BB962C8B-B14F-4D97-AF65-F5344CB8AC3E}">
+        <p14:creationId xmlns:p14="http://schemas.microsoft.com/office/powerpoint/2010/main" val="3204788620"/>
       </p:ext>
     </p:extLst>
   </p:cSld>
@@ -7834,6 +8190,28 @@
                 <a:ea typeface="+mn-ea"/>
                 <a:cs typeface="+mn-cs"/>
               </a:rPr>
+              <a:t>PyAlex</a:t>
+            </a:r>
+            <a:r>
+              <a:rPr lang="en-US" sz="1800" kern="1200" dirty="0">
+                <a:solidFill>
+                  <a:schemeClr val="tx1"/>
+                </a:solidFill>
+                <a:latin typeface="+mn-lt"/>
+                <a:ea typeface="+mn-ea"/>
+                <a:cs typeface="+mn-cs"/>
+              </a:rPr>
+              <a:t>, </a:t>
+            </a:r>
+            <a:r>
+              <a:rPr lang="en-US" sz="1800" kern="1200" dirty="0" err="1">
+                <a:solidFill>
+                  <a:schemeClr val="tx1"/>
+                </a:solidFill>
+                <a:latin typeface="+mn-lt"/>
+                <a:ea typeface="+mn-ea"/>
+                <a:cs typeface="+mn-cs"/>
+              </a:rPr>
               <a:t>Litstudy</a:t>
             </a:r>
             <a:endParaRPr lang="en-US" sz="1800" kern="1200" dirty="0">
@@ -7927,7 +8305,9 @@
     <p:bg>
       <p:bgPr>
         <a:solidFill>
-          <a:schemeClr val="bg2"/>
+          <a:schemeClr val="bg1">
+            <a:lumMod val="95000"/>
+          </a:schemeClr>
         </a:solidFill>
         <a:effectLst/>
       </p:bgPr>
@@ -7946,118 +8326,557 @@
           <a:chExt cx="0" cy="0"/>
         </a:xfrm>
       </p:grpSpPr>
-      <p:pic>
-        <p:nvPicPr>
-          <p:cNvPr id="17" name="Picture 16" descr="A close-up of a circular object&#10;&#10;AI-generated content may be incorrect.">
+      <p:sp>
+        <p:nvSpPr>
+          <p:cNvPr id="5" name="TextBox 4">
             <a:extLst>
               <a:ext uri="{FF2B5EF4-FFF2-40B4-BE49-F238E27FC236}">
-                <a16:creationId xmlns:a16="http://schemas.microsoft.com/office/drawing/2014/main" id="{0FAC67BA-CF91-D67C-DFE9-BD2C087290FB}"/>
+                <a16:creationId xmlns:a16="http://schemas.microsoft.com/office/drawing/2014/main" id="{1920EEBA-69C4-A36C-BAD0-3BE4066F491E}"/>
               </a:ext>
             </a:extLst>
           </p:cNvPr>
-          <p:cNvPicPr>
-            <a:picLocks noChangeAspect="1"/>
-          </p:cNvPicPr>
+          <p:cNvSpPr txBox="1"/>
           <p:nvPr/>
-        </p:nvPicPr>
-        <p:blipFill>
-          <a:blip r:embed="rId2">
-            <a:extLst>
-              <a:ext uri="{28A0092B-C50C-407E-A947-70E740481C1C}">
-                <a14:useLocalDpi xmlns:a14="http://schemas.microsoft.com/office/drawing/2010/main" val="0"/>
-              </a:ext>
-            </a:extLst>
-          </a:blip>
-          <a:stretch>
-            <a:fillRect/>
-          </a:stretch>
-        </p:blipFill>
+        </p:nvSpPr>
         <p:spPr>
           <a:xfrm>
-            <a:off x="0" y="-4843"/>
-            <a:ext cx="12192000" cy="6858000"/>
+            <a:off x="3048000" y="0"/>
+            <a:ext cx="6096000" cy="7109639"/>
           </a:xfrm>
           <a:prstGeom prst="rect">
             <a:avLst/>
           </a:prstGeom>
+          <a:noFill/>
         </p:spPr>
-      </p:pic>
-      <p:pic>
-        <p:nvPicPr>
-          <p:cNvPr id="13" name="Picture 12" descr="A black and blue circular object with blue dots&#10;&#10;AI-generated content may be incorrect.">
-            <a:extLst>
-              <a:ext uri="{FF2B5EF4-FFF2-40B4-BE49-F238E27FC236}">
-                <a16:creationId xmlns:a16="http://schemas.microsoft.com/office/drawing/2014/main" id="{12DBC42D-937E-655A-382E-E8ACCD9DF1AF}"/>
-              </a:ext>
-            </a:extLst>
-          </p:cNvPr>
-          <p:cNvPicPr>
-            <a:picLocks noChangeAspect="1"/>
-          </p:cNvPicPr>
-          <p:nvPr/>
-        </p:nvPicPr>
-        <p:blipFill>
-          <a:blip r:embed="rId3">
-            <a:extLst>
-              <a:ext uri="{28A0092B-C50C-407E-A947-70E740481C1C}">
-                <a14:useLocalDpi xmlns:a14="http://schemas.microsoft.com/office/drawing/2010/main" val="0"/>
-              </a:ext>
-            </a:extLst>
-          </a:blip>
-          <a:stretch>
-            <a:fillRect/>
-          </a:stretch>
-        </p:blipFill>
-        <p:spPr>
-          <a:xfrm>
-            <a:off x="3840889" y="0"/>
-            <a:ext cx="4510222" cy="3433845"/>
-          </a:xfrm>
-          <a:prstGeom prst="rect">
-            <a:avLst/>
-          </a:prstGeom>
-        </p:spPr>
-      </p:pic>
-      <p:pic>
-        <p:nvPicPr>
-          <p:cNvPr id="15" name="Picture 14" descr="A diagram of a graph&#10;&#10;AI-generated content may be incorrect.">
-            <a:extLst>
-              <a:ext uri="{FF2B5EF4-FFF2-40B4-BE49-F238E27FC236}">
-                <a16:creationId xmlns:a16="http://schemas.microsoft.com/office/drawing/2014/main" id="{24E85237-4584-CA27-8CFC-32F123433F12}"/>
-              </a:ext>
-            </a:extLst>
-          </p:cNvPr>
-          <p:cNvPicPr>
-            <a:picLocks noChangeAspect="1"/>
-          </p:cNvPicPr>
-          <p:nvPr/>
-        </p:nvPicPr>
-        <p:blipFill>
-          <a:blip r:embed="rId4">
-            <a:extLst>
-              <a:ext uri="{28A0092B-C50C-407E-A947-70E740481C1C}">
-                <a14:useLocalDpi xmlns:a14="http://schemas.microsoft.com/office/drawing/2010/main" val="0"/>
-              </a:ext>
-            </a:extLst>
-          </a:blip>
-          <a:stretch>
-            <a:fillRect/>
-          </a:stretch>
-        </p:blipFill>
-        <p:spPr>
-          <a:xfrm>
-            <a:off x="6102363" y="3426578"/>
-            <a:ext cx="4497495" cy="3424157"/>
-          </a:xfrm>
-          <a:prstGeom prst="rect">
-            <a:avLst/>
-          </a:prstGeom>
-        </p:spPr>
-      </p:pic>
+        <p:txBody>
+          <a:bodyPr wrap="square">
+            <a:spAutoFit/>
+          </a:bodyPr>
+          <a:lstStyle/>
+          <a:p>
+            <a:r>
+              <a:rPr lang="en-GB" sz="1200" dirty="0"/>
+              <a:t>import pandas as pd</a:t>
+            </a:r>
+          </a:p>
+          <a:p>
+            <a:r>
+              <a:rPr lang="en-GB" sz="1200" dirty="0"/>
+              <a:t>import </a:t>
+            </a:r>
+            <a:r>
+              <a:rPr lang="en-GB" sz="1200" dirty="0" err="1"/>
+              <a:t>json</a:t>
+            </a:r>
+            <a:endParaRPr lang="en-GB" sz="1200" dirty="0"/>
+          </a:p>
+          <a:p>
+            <a:r>
+              <a:rPr lang="en-GB" sz="1200" dirty="0"/>
+              <a:t>import requests</a:t>
+            </a:r>
+          </a:p>
+          <a:p>
+            <a:r>
+              <a:rPr lang="en-GB" sz="1200" dirty="0"/>
+              <a:t>from </a:t>
+            </a:r>
+            <a:r>
+              <a:rPr lang="en-GB" sz="1200" dirty="0" err="1"/>
+              <a:t>pyalex</a:t>
+            </a:r>
+            <a:r>
+              <a:rPr lang="en-GB" sz="1200" dirty="0"/>
+              <a:t> import Works</a:t>
+            </a:r>
+          </a:p>
+          <a:p>
+            <a:endParaRPr lang="en-GB" sz="1200" dirty="0"/>
+          </a:p>
+          <a:p>
+            <a:r>
+              <a:rPr lang="en-GB" sz="1200" dirty="0"/>
+              <a:t># Assuming </a:t>
+            </a:r>
+            <a:r>
+              <a:rPr lang="en-GB" sz="1200" dirty="0" err="1"/>
+              <a:t>maddie_df</a:t>
+            </a:r>
+            <a:r>
+              <a:rPr lang="en-GB" sz="1200" dirty="0"/>
+              <a:t> is already loaded as a pandas </a:t>
+            </a:r>
+            <a:r>
+              <a:rPr lang="en-GB" sz="1200" dirty="0" err="1"/>
+              <a:t>DataFrame</a:t>
+            </a:r>
+            <a:endParaRPr lang="en-GB" sz="1200" dirty="0"/>
+          </a:p>
+          <a:p>
+            <a:endParaRPr lang="en-GB" sz="1200" dirty="0"/>
+          </a:p>
+          <a:p>
+            <a:r>
+              <a:rPr lang="en-GB" sz="1200" dirty="0"/>
+              <a:t># Initialize dictionaries to store </a:t>
+            </a:r>
+            <a:r>
+              <a:rPr lang="en-GB" sz="1200" dirty="0" err="1"/>
+              <a:t>OpenAlex</a:t>
+            </a:r>
+            <a:r>
+              <a:rPr lang="en-GB" sz="1200" dirty="0"/>
+              <a:t> IDs and their </a:t>
+            </a:r>
+            <a:r>
+              <a:rPr lang="en-GB" sz="1200" dirty="0" err="1"/>
+              <a:t>referenced_by</a:t>
+            </a:r>
+            <a:r>
+              <a:rPr lang="en-GB" sz="1200" dirty="0"/>
+              <a:t> and </a:t>
+            </a:r>
+            <a:r>
+              <a:rPr lang="en-GB" sz="1200" dirty="0" err="1"/>
+              <a:t>cited_by</a:t>
+            </a:r>
+            <a:r>
+              <a:rPr lang="en-GB" sz="1200" dirty="0"/>
+              <a:t> IDs</a:t>
+            </a:r>
+          </a:p>
+          <a:p>
+            <a:r>
+              <a:rPr lang="en-GB" sz="1200" dirty="0" err="1"/>
+              <a:t>referenced_by_dict</a:t>
+            </a:r>
+            <a:r>
+              <a:rPr lang="en-GB" sz="1200" dirty="0"/>
+              <a:t> = {}</a:t>
+            </a:r>
+          </a:p>
+          <a:p>
+            <a:r>
+              <a:rPr lang="en-GB" sz="1200" dirty="0" err="1"/>
+              <a:t>cited_by_dict</a:t>
+            </a:r>
+            <a:r>
+              <a:rPr lang="en-GB" sz="1200" dirty="0"/>
+              <a:t> = {}</a:t>
+            </a:r>
+          </a:p>
+          <a:p>
+            <a:r>
+              <a:rPr lang="en-GB" sz="1200" dirty="0" err="1"/>
+              <a:t>test_referenced_by_dict</a:t>
+            </a:r>
+            <a:r>
+              <a:rPr lang="en-GB" sz="1200" dirty="0"/>
+              <a:t> = {}</a:t>
+            </a:r>
+          </a:p>
+          <a:p>
+            <a:r>
+              <a:rPr lang="en-GB" sz="1200" dirty="0" err="1"/>
+              <a:t>test_cited_by_dict</a:t>
+            </a:r>
+            <a:r>
+              <a:rPr lang="en-GB" sz="1200" dirty="0"/>
+              <a:t> = {}</a:t>
+            </a:r>
+          </a:p>
+          <a:p>
+            <a:endParaRPr lang="en-GB" sz="1200" dirty="0"/>
+          </a:p>
+          <a:p>
+            <a:r>
+              <a:rPr lang="en-GB" sz="1200" dirty="0"/>
+              <a:t># Iterate over each </a:t>
+            </a:r>
+            <a:r>
+              <a:rPr lang="en-GB" sz="1200" dirty="0" err="1"/>
+              <a:t>OpenAlex</a:t>
+            </a:r>
+            <a:r>
+              <a:rPr lang="en-GB" sz="1200" dirty="0"/>
+              <a:t> ID in the </a:t>
+            </a:r>
+            <a:r>
+              <a:rPr lang="en-GB" sz="1200" dirty="0" err="1"/>
+              <a:t>DataFrame</a:t>
+            </a:r>
+            <a:endParaRPr lang="en-GB" sz="1200" dirty="0"/>
+          </a:p>
+          <a:p>
+            <a:r>
+              <a:rPr lang="en-GB" sz="1200" dirty="0"/>
+              <a:t>for </a:t>
+            </a:r>
+            <a:r>
+              <a:rPr lang="en-GB" sz="1200" dirty="0" err="1"/>
+              <a:t>openalex_id</a:t>
+            </a:r>
+            <a:r>
+              <a:rPr lang="en-GB" sz="1200" dirty="0"/>
+              <a:t> in </a:t>
+            </a:r>
+            <a:r>
+              <a:rPr lang="en-GB" sz="1200" dirty="0" err="1"/>
+              <a:t>maddie_df</a:t>
+            </a:r>
+            <a:r>
+              <a:rPr lang="en-GB" sz="1200" dirty="0"/>
+              <a:t>['id']:</a:t>
+            </a:r>
+          </a:p>
+          <a:p>
+            <a:r>
+              <a:rPr lang="en-GB" sz="1200" dirty="0"/>
+              <a:t>    # Lookup information on openalex.org using </a:t>
+            </a:r>
+            <a:r>
+              <a:rPr lang="en-GB" sz="1200" dirty="0" err="1"/>
+              <a:t>pyalex</a:t>
+            </a:r>
+            <a:r>
+              <a:rPr lang="en-GB" sz="1200" dirty="0"/>
+              <a:t> library</a:t>
+            </a:r>
+          </a:p>
+          <a:p>
+            <a:r>
+              <a:rPr lang="en-GB" sz="1200" dirty="0"/>
+              <a:t>    work = Works(</a:t>
+            </a:r>
+            <a:r>
+              <a:rPr lang="en-GB" sz="1200" dirty="0" err="1"/>
+              <a:t>openalex_id</a:t>
+            </a:r>
+            <a:r>
+              <a:rPr lang="en-GB" sz="1200" dirty="0"/>
+              <a:t>).get()</a:t>
+            </a:r>
+          </a:p>
+          <a:p>
+            <a:r>
+              <a:rPr lang="en-GB" sz="1200" dirty="0"/>
+              <a:t>    </a:t>
+            </a:r>
+          </a:p>
+          <a:p>
+            <a:r>
+              <a:rPr lang="en-GB" sz="1200" dirty="0"/>
+              <a:t>    # Extract '</a:t>
+            </a:r>
+            <a:r>
+              <a:rPr lang="en-GB" sz="1200" dirty="0" err="1"/>
+              <a:t>referenced_works</a:t>
+            </a:r>
+            <a:r>
+              <a:rPr lang="en-GB" sz="1200" dirty="0"/>
+              <a:t>' </a:t>
+            </a:r>
+            <a:r>
+              <a:rPr lang="en-GB" sz="1200" dirty="0" err="1"/>
+              <a:t>OpenAlex</a:t>
+            </a:r>
+            <a:r>
+              <a:rPr lang="en-GB" sz="1200" dirty="0"/>
+              <a:t> IDs</a:t>
+            </a:r>
+          </a:p>
+          <a:p>
+            <a:r>
+              <a:rPr lang="en-GB" sz="1200" dirty="0"/>
+              <a:t>    if '</a:t>
+            </a:r>
+            <a:r>
+              <a:rPr lang="en-GB" sz="1200" dirty="0" err="1"/>
+              <a:t>referenced_works</a:t>
+            </a:r>
+            <a:r>
+              <a:rPr lang="en-GB" sz="1200" dirty="0"/>
+              <a:t>' in work:</a:t>
+            </a:r>
+          </a:p>
+          <a:p>
+            <a:r>
+              <a:rPr lang="en-GB" sz="1200" dirty="0"/>
+              <a:t>        </a:t>
+            </a:r>
+            <a:r>
+              <a:rPr lang="en-GB" sz="1200" dirty="0" err="1"/>
+              <a:t>referenced_by_dict</a:t>
+            </a:r>
+            <a:r>
+              <a:rPr lang="en-GB" sz="1200" dirty="0"/>
+              <a:t>[</a:t>
+            </a:r>
+            <a:r>
+              <a:rPr lang="en-GB" sz="1200" dirty="0" err="1"/>
+              <a:t>openalex_id</a:t>
+            </a:r>
+            <a:r>
+              <a:rPr lang="en-GB" sz="1200" dirty="0"/>
+              <a:t>] = work['</a:t>
+            </a:r>
+            <a:r>
+              <a:rPr lang="en-GB" sz="1200" dirty="0" err="1"/>
+              <a:t>referenced_works</a:t>
+            </a:r>
+            <a:r>
+              <a:rPr lang="en-GB" sz="1200" dirty="0"/>
+              <a:t>']</a:t>
+            </a:r>
+          </a:p>
+          <a:p>
+            <a:r>
+              <a:rPr lang="en-GB" sz="1200" dirty="0"/>
+              <a:t>    </a:t>
+            </a:r>
+          </a:p>
+          <a:p>
+            <a:r>
+              <a:rPr lang="en-GB" sz="1200" dirty="0"/>
+              <a:t>    # Extract '</a:t>
+            </a:r>
+            <a:r>
+              <a:rPr lang="en-GB" sz="1200" dirty="0" err="1"/>
+              <a:t>cited_by_api_url</a:t>
+            </a:r>
+            <a:r>
+              <a:rPr lang="en-GB" sz="1200" dirty="0"/>
+              <a:t>' </a:t>
+            </a:r>
+            <a:r>
+              <a:rPr lang="en-GB" sz="1200" dirty="0" err="1"/>
+              <a:t>OpenAlex</a:t>
+            </a:r>
+            <a:r>
+              <a:rPr lang="en-GB" sz="1200" dirty="0"/>
+              <a:t> IDs</a:t>
+            </a:r>
+          </a:p>
+          <a:p>
+            <a:r>
+              <a:rPr lang="en-GB" sz="1200" dirty="0"/>
+              <a:t>    if '</a:t>
+            </a:r>
+            <a:r>
+              <a:rPr lang="en-GB" sz="1200" dirty="0" err="1"/>
+              <a:t>cited_by_api_url</a:t>
+            </a:r>
+            <a:r>
+              <a:rPr lang="en-GB" sz="1200" dirty="0"/>
+              <a:t>' in work:</a:t>
+            </a:r>
+          </a:p>
+          <a:p>
+            <a:r>
+              <a:rPr lang="en-GB" sz="1200" dirty="0"/>
+              <a:t>        </a:t>
+            </a:r>
+            <a:r>
+              <a:rPr lang="en-GB" sz="1200" dirty="0" err="1"/>
+              <a:t>cited_by_api_url</a:t>
+            </a:r>
+            <a:r>
+              <a:rPr lang="en-GB" sz="1200" dirty="0"/>
+              <a:t> = work['</a:t>
+            </a:r>
+            <a:r>
+              <a:rPr lang="en-GB" sz="1200" dirty="0" err="1"/>
+              <a:t>cited_by_api_url</a:t>
+            </a:r>
+            <a:r>
+              <a:rPr lang="en-GB" sz="1200" dirty="0"/>
+              <a:t>']</a:t>
+            </a:r>
+          </a:p>
+          <a:p>
+            <a:r>
+              <a:rPr lang="en-GB" sz="1200" dirty="0"/>
+              <a:t>        response = </a:t>
+            </a:r>
+            <a:r>
+              <a:rPr lang="en-GB" sz="1200" dirty="0" err="1"/>
+              <a:t>requests.get</a:t>
+            </a:r>
+            <a:r>
+              <a:rPr lang="en-GB" sz="1200" dirty="0"/>
+              <a:t>(</a:t>
+            </a:r>
+            <a:r>
+              <a:rPr lang="en-GB" sz="1200" dirty="0" err="1"/>
+              <a:t>cited_by_api_url</a:t>
+            </a:r>
+            <a:r>
+              <a:rPr lang="en-GB" sz="1200" dirty="0"/>
+              <a:t>)</a:t>
+            </a:r>
+          </a:p>
+          <a:p>
+            <a:r>
+              <a:rPr lang="en-GB" sz="1200" dirty="0"/>
+              <a:t>        if </a:t>
+            </a:r>
+            <a:r>
+              <a:rPr lang="en-GB" sz="1200" dirty="0" err="1"/>
+              <a:t>response.status_code</a:t>
+            </a:r>
+            <a:r>
+              <a:rPr lang="en-GB" sz="1200" dirty="0"/>
+              <a:t> == 200:</a:t>
+            </a:r>
+          </a:p>
+          <a:p>
+            <a:r>
+              <a:rPr lang="en-GB" sz="1200" dirty="0"/>
+              <a:t>            </a:t>
+            </a:r>
+            <a:r>
+              <a:rPr lang="en-GB" sz="1200" dirty="0" err="1"/>
+              <a:t>cited_by_work</a:t>
+            </a:r>
+            <a:r>
+              <a:rPr lang="en-GB" sz="1200" dirty="0"/>
+              <a:t> = </a:t>
+            </a:r>
+            <a:r>
+              <a:rPr lang="en-GB" sz="1200" dirty="0" err="1"/>
+              <a:t>response.json</a:t>
+            </a:r>
+            <a:r>
+              <a:rPr lang="en-GB" sz="1200" dirty="0"/>
+              <a:t>()</a:t>
+            </a:r>
+          </a:p>
+          <a:p>
+            <a:r>
+              <a:rPr lang="en-GB" sz="1200" dirty="0"/>
+              <a:t>            if 'results' in </a:t>
+            </a:r>
+            <a:r>
+              <a:rPr lang="en-GB" sz="1200" dirty="0" err="1"/>
+              <a:t>cited_by_work</a:t>
+            </a:r>
+            <a:r>
+              <a:rPr lang="en-GB" sz="1200" dirty="0"/>
+              <a:t>:</a:t>
+            </a:r>
+          </a:p>
+          <a:p>
+            <a:r>
+              <a:rPr lang="en-GB" sz="1200" dirty="0"/>
+              <a:t>                </a:t>
+            </a:r>
+            <a:r>
+              <a:rPr lang="en-GB" sz="1200" dirty="0" err="1"/>
+              <a:t>cited_by_dict</a:t>
+            </a:r>
+            <a:r>
+              <a:rPr lang="en-GB" sz="1200" dirty="0"/>
+              <a:t>[</a:t>
+            </a:r>
+            <a:r>
+              <a:rPr lang="en-GB" sz="1200" dirty="0" err="1"/>
+              <a:t>openalex_id</a:t>
+            </a:r>
+            <a:r>
+              <a:rPr lang="en-GB" sz="1200" dirty="0"/>
+              <a:t>] = [cited['id'] for cited in </a:t>
+            </a:r>
+            <a:r>
+              <a:rPr lang="en-GB" sz="1200" dirty="0" err="1"/>
+              <a:t>cited_by_work</a:t>
+            </a:r>
+            <a:r>
+              <a:rPr lang="en-GB" sz="1200" dirty="0"/>
+              <a:t>['results’]]</a:t>
+            </a:r>
+          </a:p>
+          <a:p>
+            <a:r>
+              <a:rPr lang="en-GB" sz="1200" dirty="0"/>
+              <a:t>[…]               </a:t>
+            </a:r>
+          </a:p>
+          <a:p>
+            <a:endParaRPr lang="en-GB" sz="1200" dirty="0"/>
+          </a:p>
+          <a:p>
+            <a:r>
+              <a:rPr lang="en-GB" sz="1200" dirty="0"/>
+              <a:t># TODO: combine above for loops into a more abstracted function</a:t>
+            </a:r>
+          </a:p>
+          <a:p>
+            <a:endParaRPr lang="en-GB" sz="1200" dirty="0"/>
+          </a:p>
+          <a:p>
+            <a:r>
+              <a:rPr lang="en-GB" sz="1200" dirty="0"/>
+              <a:t># Print the dictionaries of </a:t>
+            </a:r>
+            <a:r>
+              <a:rPr lang="en-GB" sz="1200" dirty="0" err="1"/>
+              <a:t>OpenAlex</a:t>
+            </a:r>
+            <a:r>
+              <a:rPr lang="en-GB" sz="1200" dirty="0"/>
+              <a:t> IDs and their </a:t>
+            </a:r>
+            <a:r>
+              <a:rPr lang="en-GB" sz="1200" dirty="0" err="1"/>
+              <a:t>referenced_by</a:t>
+            </a:r>
+            <a:r>
+              <a:rPr lang="en-GB" sz="1200" dirty="0"/>
+              <a:t> and </a:t>
+            </a:r>
+            <a:r>
+              <a:rPr lang="en-GB" sz="1200" dirty="0" err="1"/>
+              <a:t>cited_by</a:t>
+            </a:r>
+            <a:r>
+              <a:rPr lang="en-GB" sz="1200" dirty="0"/>
+              <a:t> IDs</a:t>
+            </a:r>
+          </a:p>
+          <a:p>
+            <a:r>
+              <a:rPr lang="en-GB" sz="1200" dirty="0"/>
+              <a:t>print("Referenced by dictionary:", </a:t>
+            </a:r>
+            <a:r>
+              <a:rPr lang="en-GB" sz="1200" dirty="0" err="1"/>
+              <a:t>test_referenced_by_dict</a:t>
+            </a:r>
+            <a:r>
+              <a:rPr lang="en-GB" sz="1200" dirty="0"/>
+              <a:t>)</a:t>
+            </a:r>
+          </a:p>
+          <a:p>
+            <a:r>
+              <a:rPr lang="en-GB" sz="1200" dirty="0"/>
+              <a:t>print("Cited by dictionary:", </a:t>
+            </a:r>
+            <a:r>
+              <a:rPr lang="en-GB" sz="1200" dirty="0" err="1"/>
+              <a:t>test_cited_by_dict</a:t>
+            </a:r>
+            <a:r>
+              <a:rPr lang="en-GB" sz="1200" dirty="0"/>
+              <a:t>)</a:t>
+            </a:r>
+          </a:p>
+        </p:txBody>
+      </p:sp>
     </p:spTree>
     <p:extLst>
       <p:ext uri="{BB962C8B-B14F-4D97-AF65-F5344CB8AC3E}">
-        <p14:creationId xmlns:p14="http://schemas.microsoft.com/office/powerpoint/2010/main" val="3448502234"/>
+        <p14:creationId xmlns:p14="http://schemas.microsoft.com/office/powerpoint/2010/main" val="4252103257"/>
       </p:ext>
     </p:extLst>
   </p:cSld>
@@ -8092,68 +8911,12 @@
           <a:chExt cx="0" cy="0"/>
         </a:xfrm>
       </p:grpSpPr>
-      <p:sp>
-        <p:nvSpPr>
-          <p:cNvPr id="2" name="Title 1">
-            <a:extLst>
-              <a:ext uri="{FF2B5EF4-FFF2-40B4-BE49-F238E27FC236}">
-                <a16:creationId xmlns:a16="http://schemas.microsoft.com/office/drawing/2014/main" id="{7208797E-A21F-2C1A-56F8-EF71A7FECE9C}"/>
-              </a:ext>
-            </a:extLst>
-          </p:cNvPr>
-          <p:cNvSpPr>
-            <a:spLocks noGrp="1"/>
-          </p:cNvSpPr>
-          <p:nvPr>
-            <p:ph type="title"/>
-          </p:nvPr>
-        </p:nvSpPr>
-        <p:spPr/>
-        <p:txBody>
-          <a:bodyPr/>
-          <a:lstStyle/>
-          <a:p>
-            <a:r>
-              <a:rPr lang="en-GB" dirty="0"/>
-              <a:t>This is my summary</a:t>
-            </a:r>
-          </a:p>
-        </p:txBody>
-      </p:sp>
-      <p:sp>
-        <p:nvSpPr>
-          <p:cNvPr id="3" name="Text Placeholder 2">
-            <a:extLst>
-              <a:ext uri="{FF2B5EF4-FFF2-40B4-BE49-F238E27FC236}">
-                <a16:creationId xmlns:a16="http://schemas.microsoft.com/office/drawing/2014/main" id="{1066285B-70FD-1CFB-1083-B23680BB3487}"/>
-              </a:ext>
-            </a:extLst>
-          </p:cNvPr>
-          <p:cNvSpPr>
-            <a:spLocks noGrp="1"/>
-          </p:cNvSpPr>
-          <p:nvPr>
-            <p:ph type="body" idx="1"/>
-          </p:nvPr>
-        </p:nvSpPr>
-        <p:spPr/>
-        <p:txBody>
-          <a:bodyPr/>
-          <a:lstStyle/>
-          <a:p>
-            <a:r>
-              <a:rPr lang="en-GB" dirty="0"/>
-              <a:t>And here is a nice chart to illustrate it</a:t>
-            </a:r>
-          </a:p>
-        </p:txBody>
-      </p:sp>
       <p:pic>
         <p:nvPicPr>
-          <p:cNvPr id="5" name="Picture 4" descr="A network of colorful circles&#10;&#10;AI-generated content may be incorrect.">
+          <p:cNvPr id="13" name="Picture 12" descr="A black and blue circular object with blue dots&#10;&#10;AI-generated content may be incorrect.">
             <a:extLst>
               <a:ext uri="{FF2B5EF4-FFF2-40B4-BE49-F238E27FC236}">
-                <a16:creationId xmlns:a16="http://schemas.microsoft.com/office/drawing/2014/main" id="{5358C7FD-9443-41D4-7430-9026C930ADD4}"/>
+                <a16:creationId xmlns:a16="http://schemas.microsoft.com/office/drawing/2014/main" id="{12DBC42D-937E-655A-382E-E8ACCD9DF1AF}"/>
               </a:ext>
             </a:extLst>
           </p:cNvPr>
@@ -8176,8 +8939,158 @@
         </p:blipFill>
         <p:spPr>
           <a:xfrm>
-            <a:off x="0" y="-224904"/>
-            <a:ext cx="12192000" cy="7072215"/>
+            <a:off x="3186545" y="1722"/>
+            <a:ext cx="9005455" cy="6856278"/>
+          </a:xfrm>
+          <a:prstGeom prst="rect">
+            <a:avLst/>
+          </a:prstGeom>
+        </p:spPr>
+      </p:pic>
+      <p:sp>
+        <p:nvSpPr>
+          <p:cNvPr id="2" name="TextBox 1">
+            <a:extLst>
+              <a:ext uri="{FF2B5EF4-FFF2-40B4-BE49-F238E27FC236}">
+                <a16:creationId xmlns:a16="http://schemas.microsoft.com/office/drawing/2014/main" id="{95AD8586-7920-BDBC-622D-C7E03657F641}"/>
+              </a:ext>
+            </a:extLst>
+          </p:cNvPr>
+          <p:cNvSpPr txBox="1"/>
+          <p:nvPr/>
+        </p:nvSpPr>
+        <p:spPr>
+          <a:xfrm>
+            <a:off x="0" y="0"/>
+            <a:ext cx="3186545" cy="646331"/>
+          </a:xfrm>
+          <a:prstGeom prst="rect">
+            <a:avLst/>
+          </a:prstGeom>
+          <a:noFill/>
+        </p:spPr>
+        <p:txBody>
+          <a:bodyPr wrap="square" rtlCol="0">
+            <a:spAutoFit/>
+          </a:bodyPr>
+          <a:lstStyle/>
+          <a:p>
+            <a:r>
+              <a:rPr lang="en-GB" dirty="0"/>
+              <a:t>The ‘Eye of Sauron’ graph: utterly unusable!</a:t>
+            </a:r>
+          </a:p>
+        </p:txBody>
+      </p:sp>
+    </p:spTree>
+    <p:extLst>
+      <p:ext uri="{BB962C8B-B14F-4D97-AF65-F5344CB8AC3E}">
+        <p14:creationId xmlns:p14="http://schemas.microsoft.com/office/powerpoint/2010/main" val="3448502234"/>
+      </p:ext>
+    </p:extLst>
+  </p:cSld>
+  <p:clrMapOvr>
+    <a:masterClrMapping/>
+  </p:clrMapOvr>
+</p:sld>
+</file>
+
+<file path=ppt/slides/slide6.xml><?xml version="1.0" encoding="utf-8"?>
+<p:sld xmlns:a="http://schemas.openxmlformats.org/drawingml/2006/main" xmlns:r="http://schemas.openxmlformats.org/officeDocument/2006/relationships" xmlns:p="http://schemas.openxmlformats.org/presentationml/2006/main">
+  <p:cSld>
+    <p:bg>
+      <p:bgPr>
+        <a:solidFill>
+          <a:schemeClr val="bg2"/>
+        </a:solidFill>
+        <a:effectLst/>
+      </p:bgPr>
+    </p:bg>
+    <p:spTree>
+      <p:nvGrpSpPr>
+        <p:cNvPr id="1" name="">
+          <a:extLst>
+            <a:ext uri="{FF2B5EF4-FFF2-40B4-BE49-F238E27FC236}">
+              <a16:creationId xmlns:a16="http://schemas.microsoft.com/office/drawing/2014/main" id="{2E980496-D62E-DD0D-7100-6DE8444813C7}"/>
+            </a:ext>
+          </a:extLst>
+        </p:cNvPr>
+        <p:cNvGrpSpPr/>
+        <p:nvPr/>
+      </p:nvGrpSpPr>
+      <p:grpSpPr>
+        <a:xfrm>
+          <a:off x="0" y="0"/>
+          <a:ext cx="0" cy="0"/>
+          <a:chOff x="0" y="0"/>
+          <a:chExt cx="0" cy="0"/>
+        </a:xfrm>
+      </p:grpSpPr>
+      <p:sp>
+        <p:nvSpPr>
+          <p:cNvPr id="2" name="TextBox 1">
+            <a:extLst>
+              <a:ext uri="{FF2B5EF4-FFF2-40B4-BE49-F238E27FC236}">
+                <a16:creationId xmlns:a16="http://schemas.microsoft.com/office/drawing/2014/main" id="{188E9D38-6ED5-CC8B-7BC5-AD67629241B2}"/>
+              </a:ext>
+            </a:extLst>
+          </p:cNvPr>
+          <p:cNvSpPr txBox="1"/>
+          <p:nvPr/>
+        </p:nvSpPr>
+        <p:spPr>
+          <a:xfrm>
+            <a:off x="0" y="0"/>
+            <a:ext cx="3186545" cy="369332"/>
+          </a:xfrm>
+          <a:prstGeom prst="rect">
+            <a:avLst/>
+          </a:prstGeom>
+          <a:noFill/>
+        </p:spPr>
+        <p:txBody>
+          <a:bodyPr wrap="square" rtlCol="0">
+            <a:spAutoFit/>
+          </a:bodyPr>
+          <a:lstStyle/>
+          <a:p>
+            <a:r>
+              <a:rPr lang="en-GB" dirty="0"/>
+              <a:t>Excellent: directed</a:t>
+            </a:r>
+          </a:p>
+        </p:txBody>
+      </p:sp>
+      <p:pic>
+        <p:nvPicPr>
+          <p:cNvPr id="4" name="Picture 3" descr="A diagram of a network&#10;&#10;AI-generated content may be incorrect.">
+            <a:extLst>
+              <a:ext uri="{FF2B5EF4-FFF2-40B4-BE49-F238E27FC236}">
+                <a16:creationId xmlns:a16="http://schemas.microsoft.com/office/drawing/2014/main" id="{8E5CCEFC-D10C-982F-A519-C7AB796F3DA3}"/>
+              </a:ext>
+            </a:extLst>
+          </p:cNvPr>
+          <p:cNvPicPr>
+            <a:picLocks noChangeAspect="1"/>
+          </p:cNvPicPr>
+          <p:nvPr/>
+        </p:nvPicPr>
+        <p:blipFill>
+          <a:blip r:embed="rId2">
+            <a:extLst>
+              <a:ext uri="{28A0092B-C50C-407E-A947-70E740481C1C}">
+                <a14:useLocalDpi xmlns:a14="http://schemas.microsoft.com/office/drawing/2010/main" val="0"/>
+              </a:ext>
+            </a:extLst>
+          </a:blip>
+          <a:stretch>
+            <a:fillRect/>
+          </a:stretch>
+        </p:blipFill>
+        <p:spPr>
+          <a:xfrm>
+            <a:off x="2255230" y="0"/>
+            <a:ext cx="9936770" cy="6858000"/>
           </a:xfrm>
           <a:prstGeom prst="rect">
             <a:avLst/>
@@ -8187,7 +9100,352 @@
     </p:spTree>
     <p:extLst>
       <p:ext uri="{BB962C8B-B14F-4D97-AF65-F5344CB8AC3E}">
-        <p14:creationId xmlns:p14="http://schemas.microsoft.com/office/powerpoint/2010/main" val="3204788620"/>
+        <p14:creationId xmlns:p14="http://schemas.microsoft.com/office/powerpoint/2010/main" val="3263353591"/>
+      </p:ext>
+    </p:extLst>
+  </p:cSld>
+  <p:clrMapOvr>
+    <a:masterClrMapping/>
+  </p:clrMapOvr>
+</p:sld>
+</file>
+
+<file path=ppt/slides/slide7.xml><?xml version="1.0" encoding="utf-8"?>
+<p:sld xmlns:a="http://schemas.openxmlformats.org/drawingml/2006/main" xmlns:r="http://schemas.openxmlformats.org/officeDocument/2006/relationships" xmlns:p="http://schemas.openxmlformats.org/presentationml/2006/main">
+  <p:cSld>
+    <p:bg>
+      <p:bgPr>
+        <a:solidFill>
+          <a:schemeClr val="bg2"/>
+        </a:solidFill>
+        <a:effectLst/>
+      </p:bgPr>
+    </p:bg>
+    <p:spTree>
+      <p:nvGrpSpPr>
+        <p:cNvPr id="1" name="">
+          <a:extLst>
+            <a:ext uri="{FF2B5EF4-FFF2-40B4-BE49-F238E27FC236}">
+              <a16:creationId xmlns:a16="http://schemas.microsoft.com/office/drawing/2014/main" id="{5132C66D-A854-B2BD-7BD4-BEB061DBD8D5}"/>
+            </a:ext>
+          </a:extLst>
+        </p:cNvPr>
+        <p:cNvGrpSpPr/>
+        <p:nvPr/>
+      </p:nvGrpSpPr>
+      <p:grpSpPr>
+        <a:xfrm>
+          <a:off x="0" y="0"/>
+          <a:ext cx="0" cy="0"/>
+          <a:chOff x="0" y="0"/>
+          <a:chExt cx="0" cy="0"/>
+        </a:xfrm>
+      </p:grpSpPr>
+      <p:sp>
+        <p:nvSpPr>
+          <p:cNvPr id="2" name="TextBox 1">
+            <a:extLst>
+              <a:ext uri="{FF2B5EF4-FFF2-40B4-BE49-F238E27FC236}">
+                <a16:creationId xmlns:a16="http://schemas.microsoft.com/office/drawing/2014/main" id="{EA8063B0-7D30-BD7E-63F2-85A8F1BD3991}"/>
+              </a:ext>
+            </a:extLst>
+          </p:cNvPr>
+          <p:cNvSpPr txBox="1"/>
+          <p:nvPr/>
+        </p:nvSpPr>
+        <p:spPr>
+          <a:xfrm>
+            <a:off x="0" y="0"/>
+            <a:ext cx="3186545" cy="369332"/>
+          </a:xfrm>
+          <a:prstGeom prst="rect">
+            <a:avLst/>
+          </a:prstGeom>
+          <a:noFill/>
+        </p:spPr>
+        <p:txBody>
+          <a:bodyPr wrap="square" rtlCol="0">
+            <a:spAutoFit/>
+          </a:bodyPr>
+          <a:lstStyle/>
+          <a:p>
+            <a:r>
+              <a:rPr lang="en-GB" dirty="0"/>
+              <a:t>Excellent: undirected</a:t>
+            </a:r>
+          </a:p>
+        </p:txBody>
+      </p:sp>
+      <p:pic>
+        <p:nvPicPr>
+          <p:cNvPr id="4" name="Picture 3" descr="A group of black and blue clouds&#10;&#10;AI-generated content may be incorrect.">
+            <a:extLst>
+              <a:ext uri="{FF2B5EF4-FFF2-40B4-BE49-F238E27FC236}">
+                <a16:creationId xmlns:a16="http://schemas.microsoft.com/office/drawing/2014/main" id="{F2BD8F06-27BE-F8D0-D1A9-411A435D7E3C}"/>
+              </a:ext>
+            </a:extLst>
+          </p:cNvPr>
+          <p:cNvPicPr>
+            <a:picLocks noChangeAspect="1"/>
+          </p:cNvPicPr>
+          <p:nvPr/>
+        </p:nvPicPr>
+        <p:blipFill>
+          <a:blip r:embed="rId2">
+            <a:extLst>
+              <a:ext uri="{28A0092B-C50C-407E-A947-70E740481C1C}">
+                <a14:useLocalDpi xmlns:a14="http://schemas.microsoft.com/office/drawing/2010/main" val="0"/>
+              </a:ext>
+            </a:extLst>
+          </a:blip>
+          <a:stretch>
+            <a:fillRect/>
+          </a:stretch>
+        </p:blipFill>
+        <p:spPr>
+          <a:xfrm>
+            <a:off x="2255230" y="0"/>
+            <a:ext cx="9936770" cy="6858000"/>
+          </a:xfrm>
+          <a:prstGeom prst="rect">
+            <a:avLst/>
+          </a:prstGeom>
+        </p:spPr>
+      </p:pic>
+    </p:spTree>
+    <p:extLst>
+      <p:ext uri="{BB962C8B-B14F-4D97-AF65-F5344CB8AC3E}">
+        <p14:creationId xmlns:p14="http://schemas.microsoft.com/office/powerpoint/2010/main" val="4074861341"/>
+      </p:ext>
+    </p:extLst>
+  </p:cSld>
+  <p:clrMapOvr>
+    <a:masterClrMapping/>
+  </p:clrMapOvr>
+</p:sld>
+</file>
+
+<file path=ppt/slides/slide8.xml><?xml version="1.0" encoding="utf-8"?>
+<p:sld xmlns:a="http://schemas.openxmlformats.org/drawingml/2006/main" xmlns:r="http://schemas.openxmlformats.org/officeDocument/2006/relationships" xmlns:p="http://schemas.openxmlformats.org/presentationml/2006/main">
+  <p:cSld>
+    <p:bg>
+      <p:bgPr>
+        <a:solidFill>
+          <a:schemeClr val="bg2"/>
+        </a:solidFill>
+        <a:effectLst/>
+      </p:bgPr>
+    </p:bg>
+    <p:spTree>
+      <p:nvGrpSpPr>
+        <p:cNvPr id="1" name="">
+          <a:extLst>
+            <a:ext uri="{FF2B5EF4-FFF2-40B4-BE49-F238E27FC236}">
+              <a16:creationId xmlns:a16="http://schemas.microsoft.com/office/drawing/2014/main" id="{38DF5055-9731-7595-991A-32D89409B497}"/>
+            </a:ext>
+          </a:extLst>
+        </p:cNvPr>
+        <p:cNvGrpSpPr/>
+        <p:nvPr/>
+      </p:nvGrpSpPr>
+      <p:grpSpPr>
+        <a:xfrm>
+          <a:off x="0" y="0"/>
+          <a:ext cx="0" cy="0"/>
+          <a:chOff x="0" y="0"/>
+          <a:chExt cx="0" cy="0"/>
+        </a:xfrm>
+      </p:grpSpPr>
+      <p:sp>
+        <p:nvSpPr>
+          <p:cNvPr id="2" name="TextBox 1">
+            <a:extLst>
+              <a:ext uri="{FF2B5EF4-FFF2-40B4-BE49-F238E27FC236}">
+                <a16:creationId xmlns:a16="http://schemas.microsoft.com/office/drawing/2014/main" id="{ECB58F6E-0976-6E70-2C13-3FE86AA53705}"/>
+              </a:ext>
+            </a:extLst>
+          </p:cNvPr>
+          <p:cNvSpPr txBox="1"/>
+          <p:nvPr/>
+        </p:nvSpPr>
+        <p:spPr>
+          <a:xfrm>
+            <a:off x="0" y="0"/>
+            <a:ext cx="3186545" cy="369332"/>
+          </a:xfrm>
+          <a:prstGeom prst="rect">
+            <a:avLst/>
+          </a:prstGeom>
+          <a:noFill/>
+        </p:spPr>
+        <p:txBody>
+          <a:bodyPr wrap="square" rtlCol="0">
+            <a:spAutoFit/>
+          </a:bodyPr>
+          <a:lstStyle/>
+          <a:p>
+            <a:r>
+              <a:rPr lang="en-GB" dirty="0"/>
+              <a:t>Average: directed</a:t>
+            </a:r>
+          </a:p>
+        </p:txBody>
+      </p:sp>
+      <p:pic>
+        <p:nvPicPr>
+          <p:cNvPr id="4" name="Picture 3" descr="A diagram of a network&#10;&#10;AI-generated content may be incorrect.">
+            <a:extLst>
+              <a:ext uri="{FF2B5EF4-FFF2-40B4-BE49-F238E27FC236}">
+                <a16:creationId xmlns:a16="http://schemas.microsoft.com/office/drawing/2014/main" id="{F15934B4-8251-37DA-2C4F-AAC598CD4E7F}"/>
+              </a:ext>
+            </a:extLst>
+          </p:cNvPr>
+          <p:cNvPicPr>
+            <a:picLocks noChangeAspect="1"/>
+          </p:cNvPicPr>
+          <p:nvPr/>
+        </p:nvPicPr>
+        <p:blipFill>
+          <a:blip r:embed="rId2">
+            <a:extLst>
+              <a:ext uri="{28A0092B-C50C-407E-A947-70E740481C1C}">
+                <a14:useLocalDpi xmlns:a14="http://schemas.microsoft.com/office/drawing/2010/main" val="0"/>
+              </a:ext>
+            </a:extLst>
+          </a:blip>
+          <a:stretch>
+            <a:fillRect/>
+          </a:stretch>
+        </p:blipFill>
+        <p:spPr>
+          <a:xfrm>
+            <a:off x="2255230" y="0"/>
+            <a:ext cx="9936770" cy="6858000"/>
+          </a:xfrm>
+          <a:prstGeom prst="rect">
+            <a:avLst/>
+          </a:prstGeom>
+        </p:spPr>
+      </p:pic>
+    </p:spTree>
+    <p:extLst>
+      <p:ext uri="{BB962C8B-B14F-4D97-AF65-F5344CB8AC3E}">
+        <p14:creationId xmlns:p14="http://schemas.microsoft.com/office/powerpoint/2010/main" val="2944873762"/>
+      </p:ext>
+    </p:extLst>
+  </p:cSld>
+  <p:clrMapOvr>
+    <a:masterClrMapping/>
+  </p:clrMapOvr>
+</p:sld>
+</file>
+
+<file path=ppt/slides/slide9.xml><?xml version="1.0" encoding="utf-8"?>
+<p:sld xmlns:a="http://schemas.openxmlformats.org/drawingml/2006/main" xmlns:r="http://schemas.openxmlformats.org/officeDocument/2006/relationships" xmlns:p="http://schemas.openxmlformats.org/presentationml/2006/main">
+  <p:cSld>
+    <p:bg>
+      <p:bgPr>
+        <a:solidFill>
+          <a:schemeClr val="bg2"/>
+        </a:solidFill>
+        <a:effectLst/>
+      </p:bgPr>
+    </p:bg>
+    <p:spTree>
+      <p:nvGrpSpPr>
+        <p:cNvPr id="1" name="">
+          <a:extLst>
+            <a:ext uri="{FF2B5EF4-FFF2-40B4-BE49-F238E27FC236}">
+              <a16:creationId xmlns:a16="http://schemas.microsoft.com/office/drawing/2014/main" id="{2E628AFA-8B7A-BDCB-2F81-B46FEA7B4F69}"/>
+            </a:ext>
+          </a:extLst>
+        </p:cNvPr>
+        <p:cNvGrpSpPr/>
+        <p:nvPr/>
+      </p:nvGrpSpPr>
+      <p:grpSpPr>
+        <a:xfrm>
+          <a:off x="0" y="0"/>
+          <a:ext cx="0" cy="0"/>
+          <a:chOff x="0" y="0"/>
+          <a:chExt cx="0" cy="0"/>
+        </a:xfrm>
+      </p:grpSpPr>
+      <p:sp>
+        <p:nvSpPr>
+          <p:cNvPr id="2" name="TextBox 1">
+            <a:extLst>
+              <a:ext uri="{FF2B5EF4-FFF2-40B4-BE49-F238E27FC236}">
+                <a16:creationId xmlns:a16="http://schemas.microsoft.com/office/drawing/2014/main" id="{4E21B57F-00F6-C848-DCB6-397A33B768E3}"/>
+              </a:ext>
+            </a:extLst>
+          </p:cNvPr>
+          <p:cNvSpPr txBox="1"/>
+          <p:nvPr/>
+        </p:nvSpPr>
+        <p:spPr>
+          <a:xfrm>
+            <a:off x="0" y="0"/>
+            <a:ext cx="3186545" cy="369332"/>
+          </a:xfrm>
+          <a:prstGeom prst="rect">
+            <a:avLst/>
+          </a:prstGeom>
+          <a:noFill/>
+        </p:spPr>
+        <p:txBody>
+          <a:bodyPr wrap="square" rtlCol="0">
+            <a:spAutoFit/>
+          </a:bodyPr>
+          <a:lstStyle/>
+          <a:p>
+            <a:r>
+              <a:rPr lang="en-GB" dirty="0"/>
+              <a:t>Average: undirected</a:t>
+            </a:r>
+          </a:p>
+        </p:txBody>
+      </p:sp>
+      <p:pic>
+        <p:nvPicPr>
+          <p:cNvPr id="4" name="Picture 3" descr="A diagram of a diagram&#10;&#10;AI-generated content may be incorrect.">
+            <a:extLst>
+              <a:ext uri="{FF2B5EF4-FFF2-40B4-BE49-F238E27FC236}">
+                <a16:creationId xmlns:a16="http://schemas.microsoft.com/office/drawing/2014/main" id="{CD329151-3072-14D4-05F9-F06A87E31036}"/>
+              </a:ext>
+            </a:extLst>
+          </p:cNvPr>
+          <p:cNvPicPr>
+            <a:picLocks noChangeAspect="1"/>
+          </p:cNvPicPr>
+          <p:nvPr/>
+        </p:nvPicPr>
+        <p:blipFill>
+          <a:blip r:embed="rId2">
+            <a:extLst>
+              <a:ext uri="{28A0092B-C50C-407E-A947-70E740481C1C}">
+                <a14:useLocalDpi xmlns:a14="http://schemas.microsoft.com/office/drawing/2010/main" val="0"/>
+              </a:ext>
+            </a:extLst>
+          </a:blip>
+          <a:stretch>
+            <a:fillRect/>
+          </a:stretch>
+        </p:blipFill>
+        <p:spPr>
+          <a:xfrm>
+            <a:off x="2255230" y="0"/>
+            <a:ext cx="9936770" cy="6858000"/>
+          </a:xfrm>
+          <a:prstGeom prst="rect">
+            <a:avLst/>
+          </a:prstGeom>
+        </p:spPr>
+      </p:pic>
+    </p:spTree>
+    <p:extLst>
+      <p:ext uri="{BB962C8B-B14F-4D97-AF65-F5344CB8AC3E}">
+        <p14:creationId xmlns:p14="http://schemas.microsoft.com/office/powerpoint/2010/main" val="273028448"/>
       </p:ext>
     </p:extLst>
   </p:cSld>

</xml_diff>